<commit_message>
update pic to 0-based
</commit_message>
<xml_diff>
--- a/grid.pptx
+++ b/grid.pptx
@@ -261,7 +261,7 @@
           <a:p>
             <a:fld id="{4960A0CC-2696-4F93-ACD2-A4F3B639560D}" type="datetimeFigureOut">
               <a:rPr lang="en-GB" smtClean="0"/>
-              <a:t>08/06/2025</a:t>
+              <a:t>09/06/2025</a:t>
             </a:fld>
             <a:endParaRPr lang="en-GB" dirty="0"/>
           </a:p>
@@ -461,7 +461,7 @@
           <a:p>
             <a:fld id="{4960A0CC-2696-4F93-ACD2-A4F3B639560D}" type="datetimeFigureOut">
               <a:rPr lang="en-GB" smtClean="0"/>
-              <a:t>08/06/2025</a:t>
+              <a:t>09/06/2025</a:t>
             </a:fld>
             <a:endParaRPr lang="en-GB" dirty="0"/>
           </a:p>
@@ -671,7 +671,7 @@
           <a:p>
             <a:fld id="{4960A0CC-2696-4F93-ACD2-A4F3B639560D}" type="datetimeFigureOut">
               <a:rPr lang="en-GB" smtClean="0"/>
-              <a:t>08/06/2025</a:t>
+              <a:t>09/06/2025</a:t>
             </a:fld>
             <a:endParaRPr lang="en-GB" dirty="0"/>
           </a:p>
@@ -871,7 +871,7 @@
           <a:p>
             <a:fld id="{4960A0CC-2696-4F93-ACD2-A4F3B639560D}" type="datetimeFigureOut">
               <a:rPr lang="en-GB" smtClean="0"/>
-              <a:t>08/06/2025</a:t>
+              <a:t>09/06/2025</a:t>
             </a:fld>
             <a:endParaRPr lang="en-GB" dirty="0"/>
           </a:p>
@@ -1147,7 +1147,7 @@
           <a:p>
             <a:fld id="{4960A0CC-2696-4F93-ACD2-A4F3B639560D}" type="datetimeFigureOut">
               <a:rPr lang="en-GB" smtClean="0"/>
-              <a:t>08/06/2025</a:t>
+              <a:t>09/06/2025</a:t>
             </a:fld>
             <a:endParaRPr lang="en-GB" dirty="0"/>
           </a:p>
@@ -1415,7 +1415,7 @@
           <a:p>
             <a:fld id="{4960A0CC-2696-4F93-ACD2-A4F3B639560D}" type="datetimeFigureOut">
               <a:rPr lang="en-GB" smtClean="0"/>
-              <a:t>08/06/2025</a:t>
+              <a:t>09/06/2025</a:t>
             </a:fld>
             <a:endParaRPr lang="en-GB" dirty="0"/>
           </a:p>
@@ -1830,7 +1830,7 @@
           <a:p>
             <a:fld id="{4960A0CC-2696-4F93-ACD2-A4F3B639560D}" type="datetimeFigureOut">
               <a:rPr lang="en-GB" smtClean="0"/>
-              <a:t>08/06/2025</a:t>
+              <a:t>09/06/2025</a:t>
             </a:fld>
             <a:endParaRPr lang="en-GB" dirty="0"/>
           </a:p>
@@ -1972,7 +1972,7 @@
           <a:p>
             <a:fld id="{4960A0CC-2696-4F93-ACD2-A4F3B639560D}" type="datetimeFigureOut">
               <a:rPr lang="en-GB" smtClean="0"/>
-              <a:t>08/06/2025</a:t>
+              <a:t>09/06/2025</a:t>
             </a:fld>
             <a:endParaRPr lang="en-GB" dirty="0"/>
           </a:p>
@@ -2085,7 +2085,7 @@
           <a:p>
             <a:fld id="{4960A0CC-2696-4F93-ACD2-A4F3B639560D}" type="datetimeFigureOut">
               <a:rPr lang="en-GB" smtClean="0"/>
-              <a:t>08/06/2025</a:t>
+              <a:t>09/06/2025</a:t>
             </a:fld>
             <a:endParaRPr lang="en-GB" dirty="0"/>
           </a:p>
@@ -2398,7 +2398,7 @@
           <a:p>
             <a:fld id="{4960A0CC-2696-4F93-ACD2-A4F3B639560D}" type="datetimeFigureOut">
               <a:rPr lang="en-GB" smtClean="0"/>
-              <a:t>08/06/2025</a:t>
+              <a:t>09/06/2025</a:t>
             </a:fld>
             <a:endParaRPr lang="en-GB" dirty="0"/>
           </a:p>
@@ -2687,7 +2687,7 @@
           <a:p>
             <a:fld id="{4960A0CC-2696-4F93-ACD2-A4F3B639560D}" type="datetimeFigureOut">
               <a:rPr lang="en-GB" smtClean="0"/>
-              <a:t>08/06/2025</a:t>
+              <a:t>09/06/2025</a:t>
             </a:fld>
             <a:endParaRPr lang="en-GB" dirty="0"/>
           </a:p>
@@ -2930,7 +2930,7 @@
           <a:p>
             <a:fld id="{4960A0CC-2696-4F93-ACD2-A4F3B639560D}" type="datetimeFigureOut">
               <a:rPr lang="en-GB" smtClean="0"/>
-              <a:t>08/06/2025</a:t>
+              <a:t>09/06/2025</a:t>
             </a:fld>
             <a:endParaRPr lang="en-GB" dirty="0"/>
           </a:p>
@@ -3389,7 +3389,7 @@
             <a:pPr algn="ctr"/>
             <a:r>
               <a:rPr lang="hu-HU" dirty="0"/>
-              <a:t>1,1,</a:t>
+              <a:t>0,0,</a:t>
             </a:r>
           </a:p>
           <a:p>
@@ -3444,7 +3444,7 @@
             <a:pPr algn="ctr"/>
             <a:r>
               <a:rPr lang="hu-HU" dirty="0"/>
-              <a:t>2,1,</a:t>
+              <a:t>1,0,</a:t>
             </a:r>
           </a:p>
           <a:p>
@@ -3499,7 +3499,7 @@
             <a:pPr algn="ctr"/>
             <a:r>
               <a:rPr lang="hu-HU" dirty="0"/>
-              <a:t>3,1,</a:t>
+              <a:t>2,0,</a:t>
             </a:r>
           </a:p>
           <a:p>
@@ -3554,7 +3554,7 @@
             <a:pPr algn="ctr"/>
             <a:r>
               <a:rPr lang="hu-HU" dirty="0"/>
-              <a:t>4,1,</a:t>
+              <a:t>3,0,</a:t>
             </a:r>
           </a:p>
           <a:p>
@@ -3609,7 +3609,7 @@
             <a:pPr algn="ctr"/>
             <a:r>
               <a:rPr lang="hu-HU" dirty="0"/>
-              <a:t>1,2,</a:t>
+              <a:t>0,1,</a:t>
             </a:r>
           </a:p>
           <a:p>
@@ -3664,7 +3664,7 @@
             <a:pPr algn="ctr"/>
             <a:r>
               <a:rPr lang="hu-HU" dirty="0"/>
-              <a:t>2,2,</a:t>
+              <a:t>1,1,</a:t>
             </a:r>
           </a:p>
           <a:p>
@@ -3719,7 +3719,7 @@
             <a:pPr algn="ctr"/>
             <a:r>
               <a:rPr lang="hu-HU" dirty="0"/>
-              <a:t>3,2,</a:t>
+              <a:t>2,1,</a:t>
             </a:r>
           </a:p>
           <a:p>
@@ -3774,7 +3774,7 @@
             <a:pPr algn="ctr"/>
             <a:r>
               <a:rPr lang="hu-HU" dirty="0"/>
-              <a:t>1,3,</a:t>
+              <a:t>0,2,</a:t>
             </a:r>
           </a:p>
           <a:p>
@@ -3829,7 +3829,7 @@
             <a:pPr algn="ctr"/>
             <a:r>
               <a:rPr lang="hu-HU" dirty="0"/>
-              <a:t>2,3,</a:t>
+              <a:t>1,2,</a:t>
             </a:r>
           </a:p>
           <a:p>
@@ -3884,7 +3884,7 @@
             <a:pPr algn="ctr"/>
             <a:r>
               <a:rPr lang="hu-HU" dirty="0"/>
-              <a:t>1,4,</a:t>
+              <a:t>0,3,</a:t>
             </a:r>
           </a:p>
           <a:p>
@@ -3939,7 +3939,7 @@
             <a:pPr algn="ctr"/>
             <a:r>
               <a:rPr lang="hu-HU" dirty="0"/>
-              <a:t>1,1, down</a:t>
+              <a:t>0,0, down</a:t>
             </a:r>
             <a:endParaRPr lang="en-GB" dirty="0"/>
           </a:p>
@@ -3987,7 +3987,7 @@
             <a:pPr algn="ctr"/>
             <a:r>
               <a:rPr lang="hu-HU" dirty="0"/>
-              <a:t>2,1, down</a:t>
+              <a:t>1,0, down</a:t>
             </a:r>
             <a:endParaRPr lang="en-GB" dirty="0"/>
           </a:p>
@@ -4035,7 +4035,7 @@
             <a:pPr algn="ctr"/>
             <a:r>
               <a:rPr lang="hu-HU" dirty="0"/>
-              <a:t>3,1, down</a:t>
+              <a:t>2,0, down</a:t>
             </a:r>
             <a:endParaRPr lang="en-GB" dirty="0"/>
           </a:p>
@@ -4083,7 +4083,7 @@
             <a:pPr algn="ctr"/>
             <a:r>
               <a:rPr lang="hu-HU" dirty="0"/>
-              <a:t>1,2, down</a:t>
+              <a:t>0,1, down</a:t>
             </a:r>
             <a:endParaRPr lang="en-GB" dirty="0"/>
           </a:p>
@@ -4131,7 +4131,7 @@
             <a:pPr algn="ctr"/>
             <a:r>
               <a:rPr lang="hu-HU" dirty="0"/>
-              <a:t>2,2, down</a:t>
+              <a:t>1,1, down</a:t>
             </a:r>
             <a:endParaRPr lang="en-GB" dirty="0"/>
           </a:p>
@@ -4179,7 +4179,7 @@
             <a:pPr algn="ctr"/>
             <a:r>
               <a:rPr lang="hu-HU" dirty="0"/>
-              <a:t>1,3, down</a:t>
+              <a:t>0,2, down</a:t>
             </a:r>
             <a:endParaRPr lang="en-GB" dirty="0"/>
           </a:p>
@@ -4402,7 +4402,7 @@
                   </a:schemeClr>
                 </a:solidFill>
               </a:rPr>
-              <a:t>1,1</a:t>
+              <a:t>0,0</a:t>
             </a:r>
             <a:endParaRPr lang="en-GB" sz="2000" b="1" dirty="0">
               <a:solidFill>
@@ -4452,7 +4452,7 @@
                   </a:schemeClr>
                 </a:solidFill>
               </a:rPr>
-              <a:t>1,2</a:t>
+              <a:t>0,1</a:t>
             </a:r>
             <a:endParaRPr lang="en-GB" sz="2000" b="1" dirty="0">
               <a:solidFill>
@@ -4502,7 +4502,7 @@
                   </a:schemeClr>
                 </a:solidFill>
               </a:rPr>
-              <a:t>2,1</a:t>
+              <a:t>1,0</a:t>
             </a:r>
             <a:endParaRPr lang="en-GB" sz="2000" b="1" dirty="0">
               <a:solidFill>
@@ -4552,7 +4552,7 @@
                   </a:schemeClr>
                 </a:solidFill>
               </a:rPr>
-              <a:t>2,2</a:t>
+              <a:t>1,1</a:t>
             </a:r>
             <a:endParaRPr lang="en-GB" sz="2000" b="1" dirty="0">
               <a:solidFill>
@@ -4790,7 +4790,7 @@
                   </a:schemeClr>
                 </a:solidFill>
               </a:rPr>
-              <a:t>1,3</a:t>
+              <a:t>0,2</a:t>
             </a:r>
             <a:endParaRPr lang="en-GB" sz="2000" b="1" dirty="0">
               <a:solidFill>
@@ -4840,7 +4840,7 @@
                   </a:schemeClr>
                 </a:solidFill>
               </a:rPr>
-              <a:t>3,1</a:t>
+              <a:t>2,0</a:t>
             </a:r>
             <a:endParaRPr lang="en-GB" sz="2000" b="1" dirty="0">
               <a:solidFill>

</xml_diff>